<commit_message>
Make chat send hub method async Slide updates
</commit_message>
<xml_diff>
--- a/Getting Pushy with SignalR and Rx.pptx
+++ b/Getting Pushy with SignalR and Rx.pptx
@@ -5,7 +5,7 @@
     <p:sldMasterId id="2147483648" r:id="rId1"/>
   </p:sldMasterIdLst>
   <p:notesMasterIdLst>
-    <p:notesMasterId r:id="rId26"/>
+    <p:notesMasterId r:id="rId29"/>
   </p:notesMasterIdLst>
   <p:sldIdLst>
     <p:sldId id="256" r:id="rId2"/>
@@ -18,20 +18,23 @@
     <p:sldId id="261" r:id="rId9"/>
     <p:sldId id="270" r:id="rId10"/>
     <p:sldId id="271" r:id="rId11"/>
-    <p:sldId id="276" r:id="rId12"/>
-    <p:sldId id="280" r:id="rId13"/>
-    <p:sldId id="279" r:id="rId14"/>
-    <p:sldId id="257" r:id="rId15"/>
-    <p:sldId id="274" r:id="rId16"/>
-    <p:sldId id="275" r:id="rId17"/>
-    <p:sldId id="273" r:id="rId18"/>
-    <p:sldId id="263" r:id="rId19"/>
-    <p:sldId id="264" r:id="rId20"/>
-    <p:sldId id="265" r:id="rId21"/>
-    <p:sldId id="277" r:id="rId22"/>
-    <p:sldId id="266" r:id="rId23"/>
-    <p:sldId id="269" r:id="rId24"/>
-    <p:sldId id="267" r:id="rId25"/>
+    <p:sldId id="284" r:id="rId12"/>
+    <p:sldId id="285" r:id="rId13"/>
+    <p:sldId id="286" r:id="rId14"/>
+    <p:sldId id="276" r:id="rId15"/>
+    <p:sldId id="280" r:id="rId16"/>
+    <p:sldId id="279" r:id="rId17"/>
+    <p:sldId id="257" r:id="rId18"/>
+    <p:sldId id="274" r:id="rId19"/>
+    <p:sldId id="275" r:id="rId20"/>
+    <p:sldId id="273" r:id="rId21"/>
+    <p:sldId id="263" r:id="rId22"/>
+    <p:sldId id="264" r:id="rId23"/>
+    <p:sldId id="265" r:id="rId24"/>
+    <p:sldId id="277" r:id="rId25"/>
+    <p:sldId id="266" r:id="rId26"/>
+    <p:sldId id="269" r:id="rId27"/>
+    <p:sldId id="267" r:id="rId28"/>
   </p:sldIdLst>
   <p:sldSz cx="12192000" cy="6858000"/>
   <p:notesSz cx="6858000" cy="9144000"/>
@@ -136,10 +139,6 @@
     </p:ext>
   </p:extLst>
 </p:presentation>
-</file>
-
-<file path=ppt/revisionInfo.xml><?xml version="1.0" encoding="utf-8"?>
-<p1510:revInfo xmlns:a="http://schemas.openxmlformats.org/drawingml/2006/main" xmlns:r="http://schemas.openxmlformats.org/officeDocument/2006/relationships" xmlns:p1510="http://schemas.microsoft.com/office/powerpoint/2015/10/main"/>
 </file>
 
 <file path=ppt/diagrams/colors1.xml><?xml version="1.0" encoding="utf-8"?>
@@ -6492,7 +6491,7 @@
           <a:p>
             <a:fld id="{33CE4371-0E50-4EEC-AC15-0ABAB1E82AE7}" type="datetimeFigureOut">
               <a:rPr lang="en-US" smtClean="0"/>
-              <a:t>10/14/2017</a:t>
+              <a:t>10/4/2018</a:t>
             </a:fld>
             <a:endParaRPr lang="en-US"/>
           </a:p>
@@ -6951,7 +6950,7 @@
             <a:fld id="{B61BEF0D-F0BB-DE4B-95CE-6DB70DBA9567}" type="datetimeFigureOut">
               <a:rPr lang="en-US" dirty="0"/>
               <a:pPr/>
-              <a:t>10/14/2017</a:t>
+              <a:t>10/4/2018</a:t>
             </a:fld>
             <a:endParaRPr lang="en-US" dirty="0"/>
           </a:p>
@@ -7384,7 +7383,7 @@
             <a:fld id="{B61BEF0D-F0BB-DE4B-95CE-6DB70DBA9567}" type="datetimeFigureOut">
               <a:rPr lang="en-US" dirty="0"/>
               <a:pPr/>
-              <a:t>10/14/2017</a:t>
+              <a:t>10/4/2018</a:t>
             </a:fld>
             <a:endParaRPr lang="en-US" dirty="0"/>
           </a:p>
@@ -7631,7 +7630,7 @@
             <a:fld id="{B61BEF0D-F0BB-DE4B-95CE-6DB70DBA9567}" type="datetimeFigureOut">
               <a:rPr lang="en-US" dirty="0"/>
               <a:pPr/>
-              <a:t>10/14/2017</a:t>
+              <a:t>10/4/2018</a:t>
             </a:fld>
             <a:endParaRPr lang="en-US" dirty="0"/>
           </a:p>
@@ -7936,7 +7935,7 @@
             <a:fld id="{B61BEF0D-F0BB-DE4B-95CE-6DB70DBA9567}" type="datetimeFigureOut">
               <a:rPr lang="en-US" dirty="0"/>
               <a:pPr/>
-              <a:t>10/14/2017</a:t>
+              <a:t>10/4/2018</a:t>
             </a:fld>
             <a:endParaRPr lang="en-US" dirty="0"/>
           </a:p>
@@ -8251,7 +8250,7 @@
             <a:fld id="{B61BEF0D-F0BB-DE4B-95CE-6DB70DBA9567}" type="datetimeFigureOut">
               <a:rPr lang="en-US" dirty="0"/>
               <a:pPr/>
-              <a:t>10/14/2017</a:t>
+              <a:t>10/4/2018</a:t>
             </a:fld>
             <a:endParaRPr lang="en-US" dirty="0"/>
           </a:p>
@@ -8550,7 +8549,7 @@
             <a:fld id="{B61BEF0D-F0BB-DE4B-95CE-6DB70DBA9567}" type="datetimeFigureOut">
               <a:rPr lang="en-US" dirty="0"/>
               <a:pPr/>
-              <a:t>10/14/2017</a:t>
+              <a:t>10/4/2018</a:t>
             </a:fld>
             <a:endParaRPr lang="en-US" dirty="0"/>
           </a:p>
@@ -8914,7 +8913,7 @@
             <a:fld id="{B61BEF0D-F0BB-DE4B-95CE-6DB70DBA9567}" type="datetimeFigureOut">
               <a:rPr lang="en-US" dirty="0"/>
               <a:pPr/>
-              <a:t>10/14/2017</a:t>
+              <a:t>10/4/2018</a:t>
             </a:fld>
             <a:endParaRPr lang="en-US" dirty="0"/>
           </a:p>
@@ -9085,7 +9084,7 @@
             <a:fld id="{B61BEF0D-F0BB-DE4B-95CE-6DB70DBA9567}" type="datetimeFigureOut">
               <a:rPr lang="en-US" dirty="0"/>
               <a:pPr/>
-              <a:t>10/14/2017</a:t>
+              <a:t>10/4/2018</a:t>
             </a:fld>
             <a:endParaRPr lang="en-US" dirty="0"/>
           </a:p>
@@ -9262,7 +9261,7 @@
             <a:fld id="{B61BEF0D-F0BB-DE4B-95CE-6DB70DBA9567}" type="datetimeFigureOut">
               <a:rPr lang="en-US" dirty="0"/>
               <a:pPr/>
-              <a:t>10/14/2017</a:t>
+              <a:t>10/4/2018</a:t>
             </a:fld>
             <a:endParaRPr lang="en-US" dirty="0"/>
           </a:p>
@@ -9672,7 +9671,7 @@
             <a:fld id="{B61BEF0D-F0BB-DE4B-95CE-6DB70DBA9567}" type="datetimeFigureOut">
               <a:rPr lang="en-US" dirty="0"/>
               <a:pPr/>
-              <a:t>10/14/2017</a:t>
+              <a:t>10/4/2018</a:t>
             </a:fld>
             <a:endParaRPr lang="en-US" dirty="0"/>
           </a:p>
@@ -9919,7 +9918,7 @@
             <a:fld id="{B61BEF0D-F0BB-DE4B-95CE-6DB70DBA9567}" type="datetimeFigureOut">
               <a:rPr lang="en-US" dirty="0"/>
               <a:pPr/>
-              <a:t>10/14/2017</a:t>
+              <a:t>10/4/2018</a:t>
             </a:fld>
             <a:endParaRPr lang="en-US" dirty="0"/>
           </a:p>
@@ -10152,7 +10151,7 @@
             <a:fld id="{B61BEF0D-F0BB-DE4B-95CE-6DB70DBA9567}" type="datetimeFigureOut">
               <a:rPr lang="en-US" dirty="0"/>
               <a:pPr/>
-              <a:t>10/14/2017</a:t>
+              <a:t>10/4/2018</a:t>
             </a:fld>
             <a:endParaRPr lang="en-US" dirty="0"/>
           </a:p>
@@ -10531,7 +10530,7 @@
             <a:fld id="{B61BEF0D-F0BB-DE4B-95CE-6DB70DBA9567}" type="datetimeFigureOut">
               <a:rPr lang="en-US" dirty="0"/>
               <a:pPr/>
-              <a:t>10/14/2017</a:t>
+              <a:t>10/4/2018</a:t>
             </a:fld>
             <a:endParaRPr lang="en-US" dirty="0"/>
           </a:p>
@@ -10646,7 +10645,7 @@
             <a:fld id="{B61BEF0D-F0BB-DE4B-95CE-6DB70DBA9567}" type="datetimeFigureOut">
               <a:rPr lang="en-US" dirty="0"/>
               <a:pPr/>
-              <a:t>10/14/2017</a:t>
+              <a:t>10/4/2018</a:t>
             </a:fld>
             <a:endParaRPr lang="en-US" dirty="0"/>
           </a:p>
@@ -10738,7 +10737,7 @@
             <a:fld id="{B61BEF0D-F0BB-DE4B-95CE-6DB70DBA9567}" type="datetimeFigureOut">
               <a:rPr lang="en-US" dirty="0"/>
               <a:pPr/>
-              <a:t>10/14/2017</a:t>
+              <a:t>10/4/2018</a:t>
             </a:fld>
             <a:endParaRPr lang="en-US" dirty="0"/>
           </a:p>
@@ -10990,7 +10989,7 @@
             <a:fld id="{B61BEF0D-F0BB-DE4B-95CE-6DB70DBA9567}" type="datetimeFigureOut">
               <a:rPr lang="en-US" dirty="0"/>
               <a:pPr/>
-              <a:t>10/14/2017</a:t>
+              <a:t>10/4/2018</a:t>
             </a:fld>
             <a:endParaRPr lang="en-US" dirty="0"/>
           </a:p>
@@ -11270,7 +11269,7 @@
             <a:fld id="{B61BEF0D-F0BB-DE4B-95CE-6DB70DBA9567}" type="datetimeFigureOut">
               <a:rPr lang="en-US" dirty="0"/>
               <a:pPr/>
-              <a:t>10/14/2017</a:t>
+              <a:t>10/4/2018</a:t>
             </a:fld>
             <a:endParaRPr lang="en-US" dirty="0"/>
           </a:p>
@@ -11673,7 +11672,7 @@
             <a:fld id="{B61BEF0D-F0BB-DE4B-95CE-6DB70DBA9567}" type="datetimeFigureOut">
               <a:rPr lang="en-US" dirty="0"/>
               <a:pPr/>
-              <a:t>10/14/2017</a:t>
+              <a:t>10/4/2018</a:t>
             </a:fld>
             <a:endParaRPr lang="en-US" dirty="0"/>
           </a:p>
@@ -16881,6 +16880,118 @@
       </p:grpSpPr>
       <p:sp>
         <p:nvSpPr>
+          <p:cNvPr id="2" name="Title 1">
+            <a:extLst>
+              <a:ext uri="{FF2B5EF4-FFF2-40B4-BE49-F238E27FC236}">
+                <a16:creationId xmlns:a16="http://schemas.microsoft.com/office/drawing/2014/main" id="{61E38F25-ABC6-428C-8E92-F98007687B81}"/>
+              </a:ext>
+            </a:extLst>
+          </p:cNvPr>
+          <p:cNvSpPr>
+            <a:spLocks noGrp="1"/>
+          </p:cNvSpPr>
+          <p:nvPr>
+            <p:ph type="title"/>
+          </p:nvPr>
+        </p:nvSpPr>
+        <p:spPr/>
+        <p:txBody>
+          <a:bodyPr>
+            <a:normAutofit/>
+          </a:bodyPr>
+          <a:lstStyle/>
+          <a:p>
+            <a:endParaRPr lang="en-US"/>
+          </a:p>
+        </p:txBody>
+      </p:sp>
+      <p:sp>
+        <p:nvSpPr>
+          <p:cNvPr id="3" name="Text Placeholder 2">
+            <a:extLst>
+              <a:ext uri="{FF2B5EF4-FFF2-40B4-BE49-F238E27FC236}">
+                <a16:creationId xmlns:a16="http://schemas.microsoft.com/office/drawing/2014/main" id="{C3DBB01D-822F-4848-A8B9-F0F6F39714D6}"/>
+              </a:ext>
+            </a:extLst>
+          </p:cNvPr>
+          <p:cNvSpPr>
+            <a:spLocks noGrp="1"/>
+          </p:cNvSpPr>
+          <p:nvPr>
+            <p:ph type="body" sz="quarter" idx="10"/>
+          </p:nvPr>
+        </p:nvSpPr>
+        <p:spPr/>
+        <p:txBody>
+          <a:bodyPr/>
+          <a:lstStyle/>
+          <a:p>
+            <a:endParaRPr lang="en-US"/>
+          </a:p>
+        </p:txBody>
+      </p:sp>
+      <p:pic>
+        <p:nvPicPr>
+          <p:cNvPr id="4" name="Picture 3">
+            <a:extLst>
+              <a:ext uri="{FF2B5EF4-FFF2-40B4-BE49-F238E27FC236}">
+                <a16:creationId xmlns:a16="http://schemas.microsoft.com/office/drawing/2014/main" id="{BA4E5F24-56F4-4763-95FC-A3E857532947}"/>
+              </a:ext>
+            </a:extLst>
+          </p:cNvPr>
+          <p:cNvPicPr>
+            <a:picLocks noChangeAspect="1"/>
+          </p:cNvPicPr>
+          <p:nvPr/>
+        </p:nvPicPr>
+        <p:blipFill>
+          <a:blip r:embed="rId2"/>
+          <a:stretch>
+            <a:fillRect/>
+          </a:stretch>
+        </p:blipFill>
+        <p:spPr>
+          <a:xfrm>
+            <a:off x="1" y="0"/>
+            <a:ext cx="12192000" cy="6858000"/>
+          </a:xfrm>
+          <a:prstGeom prst="rect">
+            <a:avLst/>
+          </a:prstGeom>
+        </p:spPr>
+      </p:pic>
+    </p:spTree>
+    <p:extLst>
+      <p:ext uri="{BB962C8B-B14F-4D97-AF65-F5344CB8AC3E}">
+        <p14:creationId xmlns:p14="http://schemas.microsoft.com/office/powerpoint/2010/main" val="2493727201"/>
+      </p:ext>
+    </p:extLst>
+  </p:cSld>
+  <p:clrMapOvr>
+    <a:masterClrMapping/>
+  </p:clrMapOvr>
+</p:sld>
+</file>
+
+<file path=ppt/slides/slide12.xml><?xml version="1.0" encoding="utf-8"?>
+<p:sld xmlns:a="http://schemas.openxmlformats.org/drawingml/2006/main" xmlns:r="http://schemas.openxmlformats.org/officeDocument/2006/relationships" xmlns:p="http://schemas.openxmlformats.org/presentationml/2006/main">
+  <p:cSld>
+    <p:spTree>
+      <p:nvGrpSpPr>
+        <p:cNvPr id="1" name=""/>
+        <p:cNvGrpSpPr/>
+        <p:nvPr/>
+      </p:nvGrpSpPr>
+      <p:grpSpPr>
+        <a:xfrm>
+          <a:off x="0" y="0"/>
+          <a:ext cx="0" cy="0"/>
+          <a:chOff x="0" y="0"/>
+          <a:chExt cx="0" cy="0"/>
+        </a:xfrm>
+      </p:grpSpPr>
+      <p:sp>
+        <p:nvSpPr>
           <p:cNvPr id="6" name="Title 5">
             <a:extLst>
               <a:ext uri="{FF2B5EF4-FFF2-40B4-BE49-F238E27FC236}">
@@ -16925,8 +17036,8 @@
         </p:nvSpPr>
         <p:spPr>
           <a:xfrm>
-            <a:off x="684212" y="685800"/>
-            <a:ext cx="10232604" cy="3615267"/>
+            <a:off x="979698" y="0"/>
+            <a:ext cx="10232604" cy="4961467"/>
           </a:xfrm>
         </p:spPr>
         <p:txBody>
@@ -16936,24 +17047,6 @@
           <a:lstStyle/>
           <a:p>
             <a:r>
-              <a:rPr lang="en-US" strike="sngStrike" dirty="0">
-                <a:solidFill>
-                  <a:srgbClr val="002060"/>
-                </a:solidFill>
-              </a:rPr>
-              <a:t>Preview not shipping until after Core 2.0  </a:t>
-            </a:r>
-            <a:r>
-              <a:rPr lang="en-US" dirty="0">
-                <a:solidFill>
-                  <a:srgbClr val="002060"/>
-                </a:solidFill>
-              </a:rPr>
-              <a:t>Currently 1.0.0-alpha1-final </a:t>
-            </a:r>
-          </a:p>
-          <a:p>
-            <a:r>
               <a:rPr lang="en-US" dirty="0"/>
               <a:t>Replacing </a:t>
             </a:r>
@@ -16998,7 +17091,7 @@
           <a:p>
             <a:r>
               <a:rPr lang="en-US" dirty="0"/>
-              <a:t>New client libraries (swift)</a:t>
+              <a:t>New client libraries </a:t>
             </a:r>
           </a:p>
           <a:p>
@@ -17007,38 +17100,18 @@
               <a:t>Binary data support</a:t>
             </a:r>
           </a:p>
-        </p:txBody>
-      </p:sp>
-      <p:sp>
-        <p:nvSpPr>
-          <p:cNvPr id="8" name="Rectangle 7">
-            <a:extLst>
-              <a:ext uri="{FF2B5EF4-FFF2-40B4-BE49-F238E27FC236}">
-                <a16:creationId xmlns:a16="http://schemas.microsoft.com/office/drawing/2014/main" id="{D948FF9B-25F6-4B05-B562-2ADF2346444C}"/>
-              </a:ext>
-            </a:extLst>
-          </p:cNvPr>
-          <p:cNvSpPr/>
-          <p:nvPr/>
-        </p:nvSpPr>
-        <p:spPr>
-          <a:xfrm>
-            <a:off x="1945621" y="6488668"/>
-            <a:ext cx="6011582" cy="369332"/>
-          </a:xfrm>
-          <a:prstGeom prst="rect">
-            <a:avLst/>
-          </a:prstGeom>
-        </p:spPr>
-        <p:txBody>
-          <a:bodyPr wrap="none">
-            <a:spAutoFit/>
-          </a:bodyPr>
-          <a:lstStyle/>
           <a:p>
             <a:r>
               <a:rPr lang="en-US" dirty="0"/>
-              <a:t>http://channel9.msdn.com/Events/Build/2017/B8078</a:t>
+              <a:t>Azure </a:t>
+            </a:r>
+            <a:r>
+              <a:rPr lang="en-US" dirty="0" err="1"/>
+              <a:t>SignalR</a:t>
+            </a:r>
+            <a:r>
+              <a:rPr lang="en-US" dirty="0"/>
+              <a:t> Service</a:t>
             </a:r>
           </a:p>
         </p:txBody>
@@ -17046,7 +17119,7 @@
     </p:spTree>
     <p:extLst>
       <p:ext uri="{BB962C8B-B14F-4D97-AF65-F5344CB8AC3E}">
-        <p14:creationId xmlns:p14="http://schemas.microsoft.com/office/powerpoint/2010/main" val="1405017852"/>
+        <p14:creationId xmlns:p14="http://schemas.microsoft.com/office/powerpoint/2010/main" val="853036148"/>
       </p:ext>
     </p:extLst>
   </p:cSld>
@@ -17056,7 +17129,7 @@
 </p:sld>
 </file>
 
-<file path=ppt/slides/slide12.xml><?xml version="1.0" encoding="utf-8"?>
+<file path=ppt/slides/slide13.xml><?xml version="1.0" encoding="utf-8"?>
 <p:sld xmlns:a="http://schemas.openxmlformats.org/drawingml/2006/main" xmlns:r="http://schemas.openxmlformats.org/officeDocument/2006/relationships" xmlns:p="http://schemas.openxmlformats.org/presentationml/2006/main">
   <p:cSld>
     <p:spTree>
@@ -17117,6 +17190,271 @@
     </p:spTree>
     <p:extLst>
       <p:ext uri="{BB962C8B-B14F-4D97-AF65-F5344CB8AC3E}">
+        <p14:creationId xmlns:p14="http://schemas.microsoft.com/office/powerpoint/2010/main" val="1149696831"/>
+      </p:ext>
+    </p:extLst>
+  </p:cSld>
+  <p:clrMapOvr>
+    <a:masterClrMapping/>
+  </p:clrMapOvr>
+</p:sld>
+</file>
+
+<file path=ppt/slides/slide14.xml><?xml version="1.0" encoding="utf-8"?>
+<p:sld xmlns:a="http://schemas.openxmlformats.org/drawingml/2006/main" xmlns:r="http://schemas.openxmlformats.org/officeDocument/2006/relationships" xmlns:p="http://schemas.openxmlformats.org/presentationml/2006/main">
+  <p:cSld>
+    <p:spTree>
+      <p:nvGrpSpPr>
+        <p:cNvPr id="1" name=""/>
+        <p:cNvGrpSpPr/>
+        <p:nvPr/>
+      </p:nvGrpSpPr>
+      <p:grpSpPr>
+        <a:xfrm>
+          <a:off x="0" y="0"/>
+          <a:ext cx="0" cy="0"/>
+          <a:chOff x="0" y="0"/>
+          <a:chExt cx="0" cy="0"/>
+        </a:xfrm>
+      </p:grpSpPr>
+      <p:sp>
+        <p:nvSpPr>
+          <p:cNvPr id="6" name="Title 5">
+            <a:extLst>
+              <a:ext uri="{FF2B5EF4-FFF2-40B4-BE49-F238E27FC236}">
+                <a16:creationId xmlns:a16="http://schemas.microsoft.com/office/drawing/2014/main" id="{0E33F0F9-4EF9-4D2B-8BEE-1222CA4E5DFA}"/>
+              </a:ext>
+            </a:extLst>
+          </p:cNvPr>
+          <p:cNvSpPr>
+            <a:spLocks noGrp="1"/>
+          </p:cNvSpPr>
+          <p:nvPr>
+            <p:ph type="title"/>
+          </p:nvPr>
+        </p:nvSpPr>
+        <p:spPr/>
+        <p:txBody>
+          <a:bodyPr/>
+          <a:lstStyle/>
+          <a:p>
+            <a:r>
+              <a:rPr lang="en-US" dirty="0"/>
+              <a:t>SignalR Core</a:t>
+            </a:r>
+          </a:p>
+        </p:txBody>
+      </p:sp>
+      <p:sp>
+        <p:nvSpPr>
+          <p:cNvPr id="7" name="Content Placeholder 6">
+            <a:extLst>
+              <a:ext uri="{FF2B5EF4-FFF2-40B4-BE49-F238E27FC236}">
+                <a16:creationId xmlns:a16="http://schemas.microsoft.com/office/drawing/2014/main" id="{984E2B6B-0923-4C8C-B74B-ECD95F03DE35}"/>
+              </a:ext>
+            </a:extLst>
+          </p:cNvPr>
+          <p:cNvSpPr>
+            <a:spLocks noGrp="1"/>
+          </p:cNvSpPr>
+          <p:nvPr>
+            <p:ph idx="1"/>
+          </p:nvPr>
+        </p:nvSpPr>
+        <p:spPr>
+          <a:xfrm>
+            <a:off x="684212" y="685800"/>
+            <a:ext cx="10232604" cy="3615267"/>
+          </a:xfrm>
+        </p:spPr>
+        <p:txBody>
+          <a:bodyPr>
+            <a:normAutofit/>
+          </a:bodyPr>
+          <a:lstStyle/>
+          <a:p>
+            <a:r>
+              <a:rPr lang="en-US" strike="sngStrike" dirty="0">
+                <a:solidFill>
+                  <a:srgbClr val="002060"/>
+                </a:solidFill>
+              </a:rPr>
+              <a:t>Preview not shipping until after Core 2.0  </a:t>
+            </a:r>
+            <a:r>
+              <a:rPr lang="en-US" dirty="0">
+                <a:solidFill>
+                  <a:srgbClr val="002060"/>
+                </a:solidFill>
+              </a:rPr>
+              <a:t>Currently 1.0.0-alpha1-final </a:t>
+            </a:r>
+          </a:p>
+          <a:p>
+            <a:r>
+              <a:rPr lang="en-US" dirty="0"/>
+              <a:t>Replacing </a:t>
+            </a:r>
+            <a:r>
+              <a:rPr lang="en-US" dirty="0" err="1"/>
+              <a:t>GlobalHost</a:t>
+            </a:r>
+            <a:r>
+              <a:rPr lang="en-US" dirty="0"/>
+              <a:t> with DI</a:t>
+            </a:r>
+          </a:p>
+          <a:p>
+            <a:r>
+              <a:rPr lang="en-US" dirty="0"/>
+              <a:t>Additional transports (Not just HTTP)</a:t>
+            </a:r>
+          </a:p>
+          <a:p>
+            <a:r>
+              <a:rPr lang="en-US" dirty="0"/>
+              <a:t>Remove jQuery dependency</a:t>
+            </a:r>
+          </a:p>
+          <a:p>
+            <a:r>
+              <a:rPr lang="en-US" dirty="0"/>
+              <a:t>Drop </a:t>
+            </a:r>
+            <a:r>
+              <a:rPr lang="en-US" dirty="0" err="1"/>
+              <a:t>ForeverFrame</a:t>
+            </a:r>
+            <a:endParaRPr lang="en-US" dirty="0"/>
+          </a:p>
+          <a:p>
+            <a:r>
+              <a:rPr lang="en-US" dirty="0"/>
+              <a:t>Separate connection by hub</a:t>
+            </a:r>
+          </a:p>
+          <a:p>
+            <a:r>
+              <a:rPr lang="en-US" dirty="0"/>
+              <a:t>New client libraries (swift)</a:t>
+            </a:r>
+          </a:p>
+          <a:p>
+            <a:r>
+              <a:rPr lang="en-US" dirty="0"/>
+              <a:t>Binary data support</a:t>
+            </a:r>
+          </a:p>
+        </p:txBody>
+      </p:sp>
+      <p:sp>
+        <p:nvSpPr>
+          <p:cNvPr id="8" name="Rectangle 7">
+            <a:extLst>
+              <a:ext uri="{FF2B5EF4-FFF2-40B4-BE49-F238E27FC236}">
+                <a16:creationId xmlns:a16="http://schemas.microsoft.com/office/drawing/2014/main" id="{D948FF9B-25F6-4B05-B562-2ADF2346444C}"/>
+              </a:ext>
+            </a:extLst>
+          </p:cNvPr>
+          <p:cNvSpPr/>
+          <p:nvPr/>
+        </p:nvSpPr>
+        <p:spPr>
+          <a:xfrm>
+            <a:off x="1945621" y="6488668"/>
+            <a:ext cx="6011582" cy="369332"/>
+          </a:xfrm>
+          <a:prstGeom prst="rect">
+            <a:avLst/>
+          </a:prstGeom>
+        </p:spPr>
+        <p:txBody>
+          <a:bodyPr wrap="none">
+            <a:spAutoFit/>
+          </a:bodyPr>
+          <a:lstStyle/>
+          <a:p>
+            <a:r>
+              <a:rPr lang="en-US" dirty="0"/>
+              <a:t>http://channel9.msdn.com/Events/Build/2017/B8078</a:t>
+            </a:r>
+          </a:p>
+        </p:txBody>
+      </p:sp>
+    </p:spTree>
+    <p:extLst>
+      <p:ext uri="{BB962C8B-B14F-4D97-AF65-F5344CB8AC3E}">
+        <p14:creationId xmlns:p14="http://schemas.microsoft.com/office/powerpoint/2010/main" val="1405017852"/>
+      </p:ext>
+    </p:extLst>
+  </p:cSld>
+  <p:clrMapOvr>
+    <a:masterClrMapping/>
+  </p:clrMapOvr>
+</p:sld>
+</file>
+
+<file path=ppt/slides/slide15.xml><?xml version="1.0" encoding="utf-8"?>
+<p:sld xmlns:a="http://schemas.openxmlformats.org/drawingml/2006/main" xmlns:r="http://schemas.openxmlformats.org/officeDocument/2006/relationships" xmlns:p="http://schemas.openxmlformats.org/presentationml/2006/main">
+  <p:cSld>
+    <p:spTree>
+      <p:nvGrpSpPr>
+        <p:cNvPr id="1" name=""/>
+        <p:cNvGrpSpPr/>
+        <p:nvPr/>
+      </p:nvGrpSpPr>
+      <p:grpSpPr>
+        <a:xfrm>
+          <a:off x="0" y="0"/>
+          <a:ext cx="0" cy="0"/>
+          <a:chOff x="0" y="0"/>
+          <a:chExt cx="0" cy="0"/>
+        </a:xfrm>
+      </p:grpSpPr>
+      <p:sp>
+        <p:nvSpPr>
+          <p:cNvPr id="2" name="Title 1"/>
+          <p:cNvSpPr>
+            <a:spLocks noGrp="1"/>
+          </p:cNvSpPr>
+          <p:nvPr>
+            <p:ph type="title"/>
+          </p:nvPr>
+        </p:nvSpPr>
+        <p:spPr/>
+        <p:txBody>
+          <a:bodyPr/>
+          <a:lstStyle/>
+          <a:p>
+            <a:r>
+              <a:rPr lang="en-US" dirty="0"/>
+              <a:t>SignalR Core Demo</a:t>
+            </a:r>
+          </a:p>
+        </p:txBody>
+      </p:sp>
+      <p:sp>
+        <p:nvSpPr>
+          <p:cNvPr id="3" name="Text Placeholder 2"/>
+          <p:cNvSpPr>
+            <a:spLocks noGrp="1"/>
+          </p:cNvSpPr>
+          <p:nvPr>
+            <p:ph type="body" idx="1"/>
+          </p:nvPr>
+        </p:nvSpPr>
+        <p:spPr/>
+        <p:txBody>
+          <a:bodyPr/>
+          <a:lstStyle/>
+          <a:p>
+            <a:endParaRPr lang="en-US"/>
+          </a:p>
+        </p:txBody>
+      </p:sp>
+    </p:spTree>
+    <p:extLst>
+      <p:ext uri="{BB962C8B-B14F-4D97-AF65-F5344CB8AC3E}">
         <p14:creationId xmlns:p14="http://schemas.microsoft.com/office/powerpoint/2010/main" val="2975242036"/>
       </p:ext>
     </p:extLst>
@@ -17127,7 +17465,7 @@
 </p:sld>
 </file>
 
-<file path=ppt/slides/slide13.xml><?xml version="1.0" encoding="utf-8"?>
+<file path=ppt/slides/slide16.xml><?xml version="1.0" encoding="utf-8"?>
 <p:sld xmlns:a="http://schemas.openxmlformats.org/drawingml/2006/main" xmlns:r="http://schemas.openxmlformats.org/officeDocument/2006/relationships" xmlns:p="http://schemas.openxmlformats.org/presentationml/2006/main">
   <p:cSld>
     <p:spTree>
@@ -17380,7 +17718,7 @@
 </p:sld>
 </file>
 
-<file path=ppt/slides/slide14.xml><?xml version="1.0" encoding="utf-8"?>
+<file path=ppt/slides/slide17.xml><?xml version="1.0" encoding="utf-8"?>
 <p:sld xmlns:a="http://schemas.openxmlformats.org/drawingml/2006/main" xmlns:r="http://schemas.openxmlformats.org/officeDocument/2006/relationships" xmlns:p="http://schemas.openxmlformats.org/presentationml/2006/main">
   <p:cSld>
     <p:spTree>
@@ -18575,7 +18913,7 @@
 </p:sld>
 </file>
 
-<file path=ppt/slides/slide15.xml><?xml version="1.0" encoding="utf-8"?>
+<file path=ppt/slides/slide18.xml><?xml version="1.0" encoding="utf-8"?>
 <p:sld xmlns:a="http://schemas.openxmlformats.org/drawingml/2006/main" xmlns:r="http://schemas.openxmlformats.org/officeDocument/2006/relationships" xmlns:p="http://schemas.openxmlformats.org/presentationml/2006/main">
   <p:cSld>
     <p:spTree>
@@ -18736,7 +19074,7 @@
 </p:sld>
 </file>
 
-<file path=ppt/slides/slide16.xml><?xml version="1.0" encoding="utf-8"?>
+<file path=ppt/slides/slide19.xml><?xml version="1.0" encoding="utf-8"?>
 <p:sld xmlns:a="http://schemas.openxmlformats.org/drawingml/2006/main" xmlns:r="http://schemas.openxmlformats.org/officeDocument/2006/relationships" xmlns:p="http://schemas.openxmlformats.org/presentationml/2006/main">
   <p:cSld>
     <p:spTree>
@@ -19618,7 +19956,7 @@
 </p:sld>
 </file>
 
-<file path=ppt/slides/slide17.xml><?xml version="1.0" encoding="utf-8"?>
+<file path=ppt/slides/slide2.xml><?xml version="1.0" encoding="utf-8"?>
 <p:sld xmlns:a="http://schemas.openxmlformats.org/drawingml/2006/main" xmlns:r="http://schemas.openxmlformats.org/officeDocument/2006/relationships" xmlns:p="http://schemas.openxmlformats.org/presentationml/2006/main">
   <p:cSld>
     <p:spTree>
@@ -19652,6 +19990,491 @@
           <a:p>
             <a:r>
               <a:rPr lang="en-US" dirty="0"/>
+              <a:t>Problems with Pull - Web</a:t>
+            </a:r>
+          </a:p>
+        </p:txBody>
+      </p:sp>
+      <p:pic>
+        <p:nvPicPr>
+          <p:cNvPr id="5" name="Content Placeholder 4"/>
+          <p:cNvPicPr>
+            <a:picLocks noGrp="1" noChangeAspect="1"/>
+          </p:cNvPicPr>
+          <p:nvPr>
+            <p:ph idx="1"/>
+          </p:nvPr>
+        </p:nvPicPr>
+        <p:blipFill>
+          <a:blip r:embed="rId2">
+            <a:extLst>
+              <a:ext uri="{28A0092B-C50C-407E-A947-70E740481C1C}">
+                <a14:useLocalDpi xmlns:a14="http://schemas.microsoft.com/office/drawing/2010/main" val="0"/>
+              </a:ext>
+            </a:extLst>
+          </a:blip>
+          <a:stretch>
+            <a:fillRect/>
+          </a:stretch>
+        </p:blipFill>
+        <p:spPr>
+          <a:xfrm flipH="1">
+            <a:off x="627612" y="1654270"/>
+            <a:ext cx="1714500" cy="1714500"/>
+          </a:xfrm>
+        </p:spPr>
+      </p:pic>
+      <p:pic>
+        <p:nvPicPr>
+          <p:cNvPr id="6" name="Picture 5"/>
+          <p:cNvPicPr>
+            <a:picLocks noChangeAspect="1"/>
+          </p:cNvPicPr>
+          <p:nvPr/>
+        </p:nvPicPr>
+        <p:blipFill>
+          <a:blip r:embed="rId3">
+            <a:extLst>
+              <a:ext uri="{28A0092B-C50C-407E-A947-70E740481C1C}">
+                <a14:useLocalDpi xmlns:a14="http://schemas.microsoft.com/office/drawing/2010/main" val="0"/>
+              </a:ext>
+            </a:extLst>
+          </a:blip>
+          <a:stretch>
+            <a:fillRect/>
+          </a:stretch>
+        </p:blipFill>
+        <p:spPr>
+          <a:xfrm>
+            <a:off x="9395970" y="1708836"/>
+            <a:ext cx="1714500" cy="1714500"/>
+          </a:xfrm>
+          <a:prstGeom prst="rect">
+            <a:avLst/>
+          </a:prstGeom>
+        </p:spPr>
+      </p:pic>
+      <p:sp>
+        <p:nvSpPr>
+          <p:cNvPr id="7" name="Right Arrow 6"/>
+          <p:cNvSpPr/>
+          <p:nvPr/>
+        </p:nvSpPr>
+        <p:spPr>
+          <a:xfrm>
+            <a:off x="3374796" y="2036315"/>
+            <a:ext cx="5250730" cy="484632"/>
+          </a:xfrm>
+          <a:prstGeom prst="rightArrow">
+            <a:avLst/>
+          </a:prstGeom>
+        </p:spPr>
+        <p:style>
+          <a:lnRef idx="2">
+            <a:schemeClr val="accent1">
+              <a:shade val="50000"/>
+            </a:schemeClr>
+          </a:lnRef>
+          <a:fillRef idx="1">
+            <a:schemeClr val="accent1"/>
+          </a:fillRef>
+          <a:effectRef idx="0">
+            <a:schemeClr val="accent1"/>
+          </a:effectRef>
+          <a:fontRef idx="minor">
+            <a:schemeClr val="lt1"/>
+          </a:fontRef>
+        </p:style>
+        <p:txBody>
+          <a:bodyPr rtlCol="0" anchor="ctr"/>
+          <a:lstStyle/>
+          <a:p>
+            <a:pPr algn="ctr"/>
+            <a:endParaRPr lang="en-US"/>
+          </a:p>
+        </p:txBody>
+      </p:sp>
+      <p:sp>
+        <p:nvSpPr>
+          <p:cNvPr id="8" name="Right Arrow 7"/>
+          <p:cNvSpPr/>
+          <p:nvPr/>
+        </p:nvSpPr>
+        <p:spPr>
+          <a:xfrm flipH="1">
+            <a:off x="3374795" y="2520947"/>
+            <a:ext cx="5250730" cy="484632"/>
+          </a:xfrm>
+          <a:prstGeom prst="rightArrow">
+            <a:avLst/>
+          </a:prstGeom>
+        </p:spPr>
+        <p:style>
+          <a:lnRef idx="2">
+            <a:schemeClr val="accent1">
+              <a:shade val="50000"/>
+            </a:schemeClr>
+          </a:lnRef>
+          <a:fillRef idx="1">
+            <a:schemeClr val="accent1"/>
+          </a:fillRef>
+          <a:effectRef idx="0">
+            <a:schemeClr val="accent1"/>
+          </a:effectRef>
+          <a:fontRef idx="minor">
+            <a:schemeClr val="lt1"/>
+          </a:fontRef>
+        </p:style>
+        <p:txBody>
+          <a:bodyPr rtlCol="0" anchor="ctr"/>
+          <a:lstStyle/>
+          <a:p>
+            <a:pPr algn="ctr"/>
+            <a:endParaRPr lang="en-US"/>
+          </a:p>
+        </p:txBody>
+      </p:sp>
+      <p:sp>
+        <p:nvSpPr>
+          <p:cNvPr id="4" name="Cloud 3"/>
+          <p:cNvSpPr/>
+          <p:nvPr/>
+        </p:nvSpPr>
+        <p:spPr>
+          <a:xfrm>
+            <a:off x="4653960" y="1654270"/>
+            <a:ext cx="2783788" cy="1714500"/>
+          </a:xfrm>
+          <a:prstGeom prst="cloud">
+            <a:avLst/>
+          </a:prstGeom>
+          <a:solidFill>
+            <a:schemeClr val="tx1"/>
+          </a:solidFill>
+          <a:ln>
+            <a:noFill/>
+          </a:ln>
+          <a:effectLst>
+            <a:outerShdw blurRad="44450" dist="27940" dir="5400000" algn="ctr">
+              <a:srgbClr val="000000">
+                <a:alpha val="32000"/>
+              </a:srgbClr>
+            </a:outerShdw>
+          </a:effectLst>
+          <a:scene3d>
+            <a:camera prst="orthographicFront">
+              <a:rot lat="0" lon="0" rev="0"/>
+            </a:camera>
+            <a:lightRig rig="balanced" dir="t">
+              <a:rot lat="0" lon="0" rev="8700000"/>
+            </a:lightRig>
+          </a:scene3d>
+          <a:sp3d>
+            <a:bevelT w="190500" h="38100"/>
+          </a:sp3d>
+        </p:spPr>
+        <p:style>
+          <a:lnRef idx="2">
+            <a:schemeClr val="accent1">
+              <a:shade val="50000"/>
+            </a:schemeClr>
+          </a:lnRef>
+          <a:fillRef idx="1">
+            <a:schemeClr val="accent1"/>
+          </a:fillRef>
+          <a:effectRef idx="0">
+            <a:schemeClr val="accent1"/>
+          </a:effectRef>
+          <a:fontRef idx="minor">
+            <a:schemeClr val="lt1"/>
+          </a:fontRef>
+        </p:style>
+        <p:txBody>
+          <a:bodyPr rtlCol="0" anchor="ctr"/>
+          <a:lstStyle/>
+          <a:p>
+            <a:pPr algn="ctr"/>
+            <a:endParaRPr lang="en-US"/>
+          </a:p>
+        </p:txBody>
+      </p:sp>
+    </p:spTree>
+    <p:extLst>
+      <p:ext uri="{BB962C8B-B14F-4D97-AF65-F5344CB8AC3E}">
+        <p14:creationId xmlns:p14="http://schemas.microsoft.com/office/powerpoint/2010/main" val="1870183108"/>
+      </p:ext>
+    </p:extLst>
+  </p:cSld>
+  <p:clrMapOvr>
+    <a:masterClrMapping/>
+  </p:clrMapOvr>
+  <p:timing>
+    <p:tnLst>
+      <p:par>
+        <p:cTn id="1" dur="indefinite" restart="never" nodeType="tmRoot">
+          <p:childTnLst>
+            <p:seq concurrent="1" nextAc="seek">
+              <p:cTn id="2" dur="indefinite" nodeType="mainSeq">
+                <p:childTnLst>
+                  <p:par>
+                    <p:cTn id="3" fill="hold">
+                      <p:stCondLst>
+                        <p:cond delay="indefinite"/>
+                      </p:stCondLst>
+                      <p:childTnLst>
+                        <p:par>
+                          <p:cTn id="4" fill="hold">
+                            <p:stCondLst>
+                              <p:cond delay="0"/>
+                            </p:stCondLst>
+                            <p:childTnLst>
+                              <p:par>
+                                <p:cTn id="5" presetID="22" presetClass="entr" presetSubtype="8" fill="hold" grpId="0" nodeType="clickEffect">
+                                  <p:stCondLst>
+                                    <p:cond delay="0"/>
+                                  </p:stCondLst>
+                                  <p:childTnLst>
+                                    <p:set>
+                                      <p:cBhvr>
+                                        <p:cTn id="6" dur="1" fill="hold">
+                                          <p:stCondLst>
+                                            <p:cond delay="0"/>
+                                          </p:stCondLst>
+                                        </p:cTn>
+                                        <p:tgtEl>
+                                          <p:spTgt spid="7"/>
+                                        </p:tgtEl>
+                                        <p:attrNameLst>
+                                          <p:attrName>style.visibility</p:attrName>
+                                        </p:attrNameLst>
+                                      </p:cBhvr>
+                                      <p:to>
+                                        <p:strVal val="visible"/>
+                                      </p:to>
+                                    </p:set>
+                                    <p:animEffect transition="in" filter="wipe(left)">
+                                      <p:cBhvr>
+                                        <p:cTn id="7" dur="500"/>
+                                        <p:tgtEl>
+                                          <p:spTgt spid="7"/>
+                                        </p:tgtEl>
+                                      </p:cBhvr>
+                                    </p:animEffect>
+                                  </p:childTnLst>
+                                </p:cTn>
+                              </p:par>
+                            </p:childTnLst>
+                          </p:cTn>
+                        </p:par>
+                        <p:par>
+                          <p:cTn id="8" fill="hold">
+                            <p:stCondLst>
+                              <p:cond delay="500"/>
+                            </p:stCondLst>
+                            <p:childTnLst>
+                              <p:par>
+                                <p:cTn id="9" presetID="22" presetClass="exit" presetSubtype="8" fill="hold" grpId="1" nodeType="afterEffect">
+                                  <p:stCondLst>
+                                    <p:cond delay="0"/>
+                                  </p:stCondLst>
+                                  <p:childTnLst>
+                                    <p:animEffect transition="out" filter="wipe(left)">
+                                      <p:cBhvr>
+                                        <p:cTn id="10" dur="500"/>
+                                        <p:tgtEl>
+                                          <p:spTgt spid="7"/>
+                                        </p:tgtEl>
+                                      </p:cBhvr>
+                                    </p:animEffect>
+                                    <p:set>
+                                      <p:cBhvr>
+                                        <p:cTn id="11" dur="1" fill="hold">
+                                          <p:stCondLst>
+                                            <p:cond delay="499"/>
+                                          </p:stCondLst>
+                                        </p:cTn>
+                                        <p:tgtEl>
+                                          <p:spTgt spid="7"/>
+                                        </p:tgtEl>
+                                        <p:attrNameLst>
+                                          <p:attrName>style.visibility</p:attrName>
+                                        </p:attrNameLst>
+                                      </p:cBhvr>
+                                      <p:to>
+                                        <p:strVal val="hidden"/>
+                                      </p:to>
+                                    </p:set>
+                                  </p:childTnLst>
+                                </p:cTn>
+                              </p:par>
+                            </p:childTnLst>
+                          </p:cTn>
+                        </p:par>
+                      </p:childTnLst>
+                    </p:cTn>
+                  </p:par>
+                  <p:par>
+                    <p:cTn id="12" fill="hold">
+                      <p:stCondLst>
+                        <p:cond delay="indefinite"/>
+                      </p:stCondLst>
+                      <p:childTnLst>
+                        <p:par>
+                          <p:cTn id="13" fill="hold">
+                            <p:stCondLst>
+                              <p:cond delay="0"/>
+                            </p:stCondLst>
+                            <p:childTnLst>
+                              <p:par>
+                                <p:cTn id="14" presetID="22" presetClass="entr" presetSubtype="2" fill="hold" grpId="0" nodeType="clickEffect">
+                                  <p:stCondLst>
+                                    <p:cond delay="0"/>
+                                  </p:stCondLst>
+                                  <p:childTnLst>
+                                    <p:set>
+                                      <p:cBhvr>
+                                        <p:cTn id="15" dur="1" fill="hold">
+                                          <p:stCondLst>
+                                            <p:cond delay="0"/>
+                                          </p:stCondLst>
+                                        </p:cTn>
+                                        <p:tgtEl>
+                                          <p:spTgt spid="8"/>
+                                        </p:tgtEl>
+                                        <p:attrNameLst>
+                                          <p:attrName>style.visibility</p:attrName>
+                                        </p:attrNameLst>
+                                      </p:cBhvr>
+                                      <p:to>
+                                        <p:strVal val="visible"/>
+                                      </p:to>
+                                    </p:set>
+                                    <p:animEffect transition="in" filter="wipe(right)">
+                                      <p:cBhvr>
+                                        <p:cTn id="16" dur="500"/>
+                                        <p:tgtEl>
+                                          <p:spTgt spid="8"/>
+                                        </p:tgtEl>
+                                      </p:cBhvr>
+                                    </p:animEffect>
+                                  </p:childTnLst>
+                                </p:cTn>
+                              </p:par>
+                            </p:childTnLst>
+                          </p:cTn>
+                        </p:par>
+                        <p:par>
+                          <p:cTn id="17" fill="hold">
+                            <p:stCondLst>
+                              <p:cond delay="500"/>
+                            </p:stCondLst>
+                            <p:childTnLst>
+                              <p:par>
+                                <p:cTn id="18" presetID="22" presetClass="exit" presetSubtype="2" fill="hold" grpId="1" nodeType="afterEffect">
+                                  <p:stCondLst>
+                                    <p:cond delay="0"/>
+                                  </p:stCondLst>
+                                  <p:childTnLst>
+                                    <p:animEffect transition="out" filter="wipe(right)">
+                                      <p:cBhvr>
+                                        <p:cTn id="19" dur="500"/>
+                                        <p:tgtEl>
+                                          <p:spTgt spid="8"/>
+                                        </p:tgtEl>
+                                      </p:cBhvr>
+                                    </p:animEffect>
+                                    <p:set>
+                                      <p:cBhvr>
+                                        <p:cTn id="20" dur="1" fill="hold">
+                                          <p:stCondLst>
+                                            <p:cond delay="499"/>
+                                          </p:stCondLst>
+                                        </p:cTn>
+                                        <p:tgtEl>
+                                          <p:spTgt spid="8"/>
+                                        </p:tgtEl>
+                                        <p:attrNameLst>
+                                          <p:attrName>style.visibility</p:attrName>
+                                        </p:attrNameLst>
+                                      </p:cBhvr>
+                                      <p:to>
+                                        <p:strVal val="hidden"/>
+                                      </p:to>
+                                    </p:set>
+                                  </p:childTnLst>
+                                </p:cTn>
+                              </p:par>
+                            </p:childTnLst>
+                          </p:cTn>
+                        </p:par>
+                      </p:childTnLst>
+                    </p:cTn>
+                  </p:par>
+                </p:childTnLst>
+              </p:cTn>
+              <p:prevCondLst>
+                <p:cond evt="onPrev" delay="0">
+                  <p:tgtEl>
+                    <p:sldTgt/>
+                  </p:tgtEl>
+                </p:cond>
+              </p:prevCondLst>
+              <p:nextCondLst>
+                <p:cond evt="onNext" delay="0">
+                  <p:tgtEl>
+                    <p:sldTgt/>
+                  </p:tgtEl>
+                </p:cond>
+              </p:nextCondLst>
+            </p:seq>
+          </p:childTnLst>
+        </p:cTn>
+      </p:par>
+    </p:tnLst>
+    <p:bldLst>
+      <p:bldP spid="7" grpId="0" animBg="1"/>
+      <p:bldP spid="7" grpId="1" animBg="1"/>
+      <p:bldP spid="8" grpId="0" animBg="1"/>
+      <p:bldP spid="8" grpId="1" animBg="1"/>
+    </p:bldLst>
+  </p:timing>
+</p:sld>
+</file>
+
+<file path=ppt/slides/slide20.xml><?xml version="1.0" encoding="utf-8"?>
+<p:sld xmlns:a="http://schemas.openxmlformats.org/drawingml/2006/main" xmlns:r="http://schemas.openxmlformats.org/officeDocument/2006/relationships" xmlns:p="http://schemas.openxmlformats.org/presentationml/2006/main">
+  <p:cSld>
+    <p:spTree>
+      <p:nvGrpSpPr>
+        <p:cNvPr id="1" name=""/>
+        <p:cNvGrpSpPr/>
+        <p:nvPr/>
+      </p:nvGrpSpPr>
+      <p:grpSpPr>
+        <a:xfrm>
+          <a:off x="0" y="0"/>
+          <a:ext cx="0" cy="0"/>
+          <a:chOff x="0" y="0"/>
+          <a:chExt cx="0" cy="0"/>
+        </a:xfrm>
+      </p:grpSpPr>
+      <p:sp>
+        <p:nvSpPr>
+          <p:cNvPr id="2" name="Title 1"/>
+          <p:cNvSpPr>
+            <a:spLocks noGrp="1"/>
+          </p:cNvSpPr>
+          <p:nvPr>
+            <p:ph type="title"/>
+          </p:nvPr>
+        </p:nvSpPr>
+        <p:spPr/>
+        <p:txBody>
+          <a:bodyPr/>
+          <a:lstStyle/>
+          <a:p>
+            <a:r>
+              <a:rPr lang="en-US" dirty="0"/>
               <a:t>Rx Demo</a:t>
             </a:r>
           </a:p>
@@ -19689,7 +20512,7 @@
 </p:sld>
 </file>
 
-<file path=ppt/slides/slide18.xml><?xml version="1.0" encoding="utf-8"?>
+<file path=ppt/slides/slide21.xml><?xml version="1.0" encoding="utf-8"?>
 <p:sld xmlns:a="http://schemas.openxmlformats.org/drawingml/2006/main" xmlns:r="http://schemas.openxmlformats.org/officeDocument/2006/relationships" xmlns:p="http://schemas.openxmlformats.org/presentationml/2006/main">
   <p:cSld>
     <p:spTree>
@@ -22197,7 +23020,7 @@
 </p:sld>
 </file>
 
-<file path=ppt/slides/slide19.xml><?xml version="1.0" encoding="utf-8"?>
+<file path=ppt/slides/slide22.xml><?xml version="1.0" encoding="utf-8"?>
 <p:sld xmlns:a="http://schemas.openxmlformats.org/drawingml/2006/main" xmlns:r="http://schemas.openxmlformats.org/officeDocument/2006/relationships" xmlns:p="http://schemas.openxmlformats.org/presentationml/2006/main">
   <p:cSld>
     <p:spTree>
@@ -23504,492 +24327,7 @@
 </p:sld>
 </file>
 
-<file path=ppt/slides/slide2.xml><?xml version="1.0" encoding="utf-8"?>
-<p:sld xmlns:a="http://schemas.openxmlformats.org/drawingml/2006/main" xmlns:r="http://schemas.openxmlformats.org/officeDocument/2006/relationships" xmlns:p="http://schemas.openxmlformats.org/presentationml/2006/main">
-  <p:cSld>
-    <p:spTree>
-      <p:nvGrpSpPr>
-        <p:cNvPr id="1" name=""/>
-        <p:cNvGrpSpPr/>
-        <p:nvPr/>
-      </p:nvGrpSpPr>
-      <p:grpSpPr>
-        <a:xfrm>
-          <a:off x="0" y="0"/>
-          <a:ext cx="0" cy="0"/>
-          <a:chOff x="0" y="0"/>
-          <a:chExt cx="0" cy="0"/>
-        </a:xfrm>
-      </p:grpSpPr>
-      <p:sp>
-        <p:nvSpPr>
-          <p:cNvPr id="2" name="Title 1"/>
-          <p:cNvSpPr>
-            <a:spLocks noGrp="1"/>
-          </p:cNvSpPr>
-          <p:nvPr>
-            <p:ph type="title"/>
-          </p:nvPr>
-        </p:nvSpPr>
-        <p:spPr/>
-        <p:txBody>
-          <a:bodyPr/>
-          <a:lstStyle/>
-          <a:p>
-            <a:r>
-              <a:rPr lang="en-US" dirty="0"/>
-              <a:t>Problems with Pull - Web</a:t>
-            </a:r>
-          </a:p>
-        </p:txBody>
-      </p:sp>
-      <p:pic>
-        <p:nvPicPr>
-          <p:cNvPr id="5" name="Content Placeholder 4"/>
-          <p:cNvPicPr>
-            <a:picLocks noGrp="1" noChangeAspect="1"/>
-          </p:cNvPicPr>
-          <p:nvPr>
-            <p:ph idx="1"/>
-          </p:nvPr>
-        </p:nvPicPr>
-        <p:blipFill>
-          <a:blip r:embed="rId2">
-            <a:extLst>
-              <a:ext uri="{28A0092B-C50C-407E-A947-70E740481C1C}">
-                <a14:useLocalDpi xmlns:a14="http://schemas.microsoft.com/office/drawing/2010/main" val="0"/>
-              </a:ext>
-            </a:extLst>
-          </a:blip>
-          <a:stretch>
-            <a:fillRect/>
-          </a:stretch>
-        </p:blipFill>
-        <p:spPr>
-          <a:xfrm flipH="1">
-            <a:off x="627612" y="1654270"/>
-            <a:ext cx="1714500" cy="1714500"/>
-          </a:xfrm>
-        </p:spPr>
-      </p:pic>
-      <p:pic>
-        <p:nvPicPr>
-          <p:cNvPr id="6" name="Picture 5"/>
-          <p:cNvPicPr>
-            <a:picLocks noChangeAspect="1"/>
-          </p:cNvPicPr>
-          <p:nvPr/>
-        </p:nvPicPr>
-        <p:blipFill>
-          <a:blip r:embed="rId3">
-            <a:extLst>
-              <a:ext uri="{28A0092B-C50C-407E-A947-70E740481C1C}">
-                <a14:useLocalDpi xmlns:a14="http://schemas.microsoft.com/office/drawing/2010/main" val="0"/>
-              </a:ext>
-            </a:extLst>
-          </a:blip>
-          <a:stretch>
-            <a:fillRect/>
-          </a:stretch>
-        </p:blipFill>
-        <p:spPr>
-          <a:xfrm>
-            <a:off x="9395970" y="1708836"/>
-            <a:ext cx="1714500" cy="1714500"/>
-          </a:xfrm>
-          <a:prstGeom prst="rect">
-            <a:avLst/>
-          </a:prstGeom>
-        </p:spPr>
-      </p:pic>
-      <p:sp>
-        <p:nvSpPr>
-          <p:cNvPr id="7" name="Right Arrow 6"/>
-          <p:cNvSpPr/>
-          <p:nvPr/>
-        </p:nvSpPr>
-        <p:spPr>
-          <a:xfrm>
-            <a:off x="3374796" y="2036315"/>
-            <a:ext cx="5250730" cy="484632"/>
-          </a:xfrm>
-          <a:prstGeom prst="rightArrow">
-            <a:avLst/>
-          </a:prstGeom>
-        </p:spPr>
-        <p:style>
-          <a:lnRef idx="2">
-            <a:schemeClr val="accent1">
-              <a:shade val="50000"/>
-            </a:schemeClr>
-          </a:lnRef>
-          <a:fillRef idx="1">
-            <a:schemeClr val="accent1"/>
-          </a:fillRef>
-          <a:effectRef idx="0">
-            <a:schemeClr val="accent1"/>
-          </a:effectRef>
-          <a:fontRef idx="minor">
-            <a:schemeClr val="lt1"/>
-          </a:fontRef>
-        </p:style>
-        <p:txBody>
-          <a:bodyPr rtlCol="0" anchor="ctr"/>
-          <a:lstStyle/>
-          <a:p>
-            <a:pPr algn="ctr"/>
-            <a:endParaRPr lang="en-US"/>
-          </a:p>
-        </p:txBody>
-      </p:sp>
-      <p:sp>
-        <p:nvSpPr>
-          <p:cNvPr id="8" name="Right Arrow 7"/>
-          <p:cNvSpPr/>
-          <p:nvPr/>
-        </p:nvSpPr>
-        <p:spPr>
-          <a:xfrm flipH="1">
-            <a:off x="3374795" y="2520947"/>
-            <a:ext cx="5250730" cy="484632"/>
-          </a:xfrm>
-          <a:prstGeom prst="rightArrow">
-            <a:avLst/>
-          </a:prstGeom>
-        </p:spPr>
-        <p:style>
-          <a:lnRef idx="2">
-            <a:schemeClr val="accent1">
-              <a:shade val="50000"/>
-            </a:schemeClr>
-          </a:lnRef>
-          <a:fillRef idx="1">
-            <a:schemeClr val="accent1"/>
-          </a:fillRef>
-          <a:effectRef idx="0">
-            <a:schemeClr val="accent1"/>
-          </a:effectRef>
-          <a:fontRef idx="minor">
-            <a:schemeClr val="lt1"/>
-          </a:fontRef>
-        </p:style>
-        <p:txBody>
-          <a:bodyPr rtlCol="0" anchor="ctr"/>
-          <a:lstStyle/>
-          <a:p>
-            <a:pPr algn="ctr"/>
-            <a:endParaRPr lang="en-US"/>
-          </a:p>
-        </p:txBody>
-      </p:sp>
-      <p:sp>
-        <p:nvSpPr>
-          <p:cNvPr id="4" name="Cloud 3"/>
-          <p:cNvSpPr/>
-          <p:nvPr/>
-        </p:nvSpPr>
-        <p:spPr>
-          <a:xfrm>
-            <a:off x="4653960" y="1654270"/>
-            <a:ext cx="2783788" cy="1714500"/>
-          </a:xfrm>
-          <a:prstGeom prst="cloud">
-            <a:avLst/>
-          </a:prstGeom>
-          <a:solidFill>
-            <a:schemeClr val="tx1"/>
-          </a:solidFill>
-          <a:ln>
-            <a:noFill/>
-          </a:ln>
-          <a:effectLst>
-            <a:outerShdw blurRad="44450" dist="27940" dir="5400000" algn="ctr">
-              <a:srgbClr val="000000">
-                <a:alpha val="32000"/>
-              </a:srgbClr>
-            </a:outerShdw>
-          </a:effectLst>
-          <a:scene3d>
-            <a:camera prst="orthographicFront">
-              <a:rot lat="0" lon="0" rev="0"/>
-            </a:camera>
-            <a:lightRig rig="balanced" dir="t">
-              <a:rot lat="0" lon="0" rev="8700000"/>
-            </a:lightRig>
-          </a:scene3d>
-          <a:sp3d>
-            <a:bevelT w="190500" h="38100"/>
-          </a:sp3d>
-        </p:spPr>
-        <p:style>
-          <a:lnRef idx="2">
-            <a:schemeClr val="accent1">
-              <a:shade val="50000"/>
-            </a:schemeClr>
-          </a:lnRef>
-          <a:fillRef idx="1">
-            <a:schemeClr val="accent1"/>
-          </a:fillRef>
-          <a:effectRef idx="0">
-            <a:schemeClr val="accent1"/>
-          </a:effectRef>
-          <a:fontRef idx="minor">
-            <a:schemeClr val="lt1"/>
-          </a:fontRef>
-        </p:style>
-        <p:txBody>
-          <a:bodyPr rtlCol="0" anchor="ctr"/>
-          <a:lstStyle/>
-          <a:p>
-            <a:pPr algn="ctr"/>
-            <a:endParaRPr lang="en-US"/>
-          </a:p>
-        </p:txBody>
-      </p:sp>
-    </p:spTree>
-    <p:extLst>
-      <p:ext uri="{BB962C8B-B14F-4D97-AF65-F5344CB8AC3E}">
-        <p14:creationId xmlns:p14="http://schemas.microsoft.com/office/powerpoint/2010/main" val="1870183108"/>
-      </p:ext>
-    </p:extLst>
-  </p:cSld>
-  <p:clrMapOvr>
-    <a:masterClrMapping/>
-  </p:clrMapOvr>
-  <p:timing>
-    <p:tnLst>
-      <p:par>
-        <p:cTn id="1" dur="indefinite" restart="never" nodeType="tmRoot">
-          <p:childTnLst>
-            <p:seq concurrent="1" nextAc="seek">
-              <p:cTn id="2" dur="indefinite" nodeType="mainSeq">
-                <p:childTnLst>
-                  <p:par>
-                    <p:cTn id="3" fill="hold">
-                      <p:stCondLst>
-                        <p:cond delay="indefinite"/>
-                      </p:stCondLst>
-                      <p:childTnLst>
-                        <p:par>
-                          <p:cTn id="4" fill="hold">
-                            <p:stCondLst>
-                              <p:cond delay="0"/>
-                            </p:stCondLst>
-                            <p:childTnLst>
-                              <p:par>
-                                <p:cTn id="5" presetID="22" presetClass="entr" presetSubtype="8" fill="hold" grpId="0" nodeType="clickEffect">
-                                  <p:stCondLst>
-                                    <p:cond delay="0"/>
-                                  </p:stCondLst>
-                                  <p:childTnLst>
-                                    <p:set>
-                                      <p:cBhvr>
-                                        <p:cTn id="6" dur="1" fill="hold">
-                                          <p:stCondLst>
-                                            <p:cond delay="0"/>
-                                          </p:stCondLst>
-                                        </p:cTn>
-                                        <p:tgtEl>
-                                          <p:spTgt spid="7"/>
-                                        </p:tgtEl>
-                                        <p:attrNameLst>
-                                          <p:attrName>style.visibility</p:attrName>
-                                        </p:attrNameLst>
-                                      </p:cBhvr>
-                                      <p:to>
-                                        <p:strVal val="visible"/>
-                                      </p:to>
-                                    </p:set>
-                                    <p:animEffect transition="in" filter="wipe(left)">
-                                      <p:cBhvr>
-                                        <p:cTn id="7" dur="500"/>
-                                        <p:tgtEl>
-                                          <p:spTgt spid="7"/>
-                                        </p:tgtEl>
-                                      </p:cBhvr>
-                                    </p:animEffect>
-                                  </p:childTnLst>
-                                </p:cTn>
-                              </p:par>
-                            </p:childTnLst>
-                          </p:cTn>
-                        </p:par>
-                        <p:par>
-                          <p:cTn id="8" fill="hold">
-                            <p:stCondLst>
-                              <p:cond delay="500"/>
-                            </p:stCondLst>
-                            <p:childTnLst>
-                              <p:par>
-                                <p:cTn id="9" presetID="22" presetClass="exit" presetSubtype="8" fill="hold" grpId="1" nodeType="afterEffect">
-                                  <p:stCondLst>
-                                    <p:cond delay="0"/>
-                                  </p:stCondLst>
-                                  <p:childTnLst>
-                                    <p:animEffect transition="out" filter="wipe(left)">
-                                      <p:cBhvr>
-                                        <p:cTn id="10" dur="500"/>
-                                        <p:tgtEl>
-                                          <p:spTgt spid="7"/>
-                                        </p:tgtEl>
-                                      </p:cBhvr>
-                                    </p:animEffect>
-                                    <p:set>
-                                      <p:cBhvr>
-                                        <p:cTn id="11" dur="1" fill="hold">
-                                          <p:stCondLst>
-                                            <p:cond delay="499"/>
-                                          </p:stCondLst>
-                                        </p:cTn>
-                                        <p:tgtEl>
-                                          <p:spTgt spid="7"/>
-                                        </p:tgtEl>
-                                        <p:attrNameLst>
-                                          <p:attrName>style.visibility</p:attrName>
-                                        </p:attrNameLst>
-                                      </p:cBhvr>
-                                      <p:to>
-                                        <p:strVal val="hidden"/>
-                                      </p:to>
-                                    </p:set>
-                                  </p:childTnLst>
-                                </p:cTn>
-                              </p:par>
-                            </p:childTnLst>
-                          </p:cTn>
-                        </p:par>
-                      </p:childTnLst>
-                    </p:cTn>
-                  </p:par>
-                  <p:par>
-                    <p:cTn id="12" fill="hold">
-                      <p:stCondLst>
-                        <p:cond delay="indefinite"/>
-                      </p:stCondLst>
-                      <p:childTnLst>
-                        <p:par>
-                          <p:cTn id="13" fill="hold">
-                            <p:stCondLst>
-                              <p:cond delay="0"/>
-                            </p:stCondLst>
-                            <p:childTnLst>
-                              <p:par>
-                                <p:cTn id="14" presetID="22" presetClass="entr" presetSubtype="2" fill="hold" grpId="0" nodeType="clickEffect">
-                                  <p:stCondLst>
-                                    <p:cond delay="0"/>
-                                  </p:stCondLst>
-                                  <p:childTnLst>
-                                    <p:set>
-                                      <p:cBhvr>
-                                        <p:cTn id="15" dur="1" fill="hold">
-                                          <p:stCondLst>
-                                            <p:cond delay="0"/>
-                                          </p:stCondLst>
-                                        </p:cTn>
-                                        <p:tgtEl>
-                                          <p:spTgt spid="8"/>
-                                        </p:tgtEl>
-                                        <p:attrNameLst>
-                                          <p:attrName>style.visibility</p:attrName>
-                                        </p:attrNameLst>
-                                      </p:cBhvr>
-                                      <p:to>
-                                        <p:strVal val="visible"/>
-                                      </p:to>
-                                    </p:set>
-                                    <p:animEffect transition="in" filter="wipe(right)">
-                                      <p:cBhvr>
-                                        <p:cTn id="16" dur="500"/>
-                                        <p:tgtEl>
-                                          <p:spTgt spid="8"/>
-                                        </p:tgtEl>
-                                      </p:cBhvr>
-                                    </p:animEffect>
-                                  </p:childTnLst>
-                                </p:cTn>
-                              </p:par>
-                            </p:childTnLst>
-                          </p:cTn>
-                        </p:par>
-                        <p:par>
-                          <p:cTn id="17" fill="hold">
-                            <p:stCondLst>
-                              <p:cond delay="500"/>
-                            </p:stCondLst>
-                            <p:childTnLst>
-                              <p:par>
-                                <p:cTn id="18" presetID="22" presetClass="exit" presetSubtype="2" fill="hold" grpId="1" nodeType="afterEffect">
-                                  <p:stCondLst>
-                                    <p:cond delay="0"/>
-                                  </p:stCondLst>
-                                  <p:childTnLst>
-                                    <p:animEffect transition="out" filter="wipe(right)">
-                                      <p:cBhvr>
-                                        <p:cTn id="19" dur="500"/>
-                                        <p:tgtEl>
-                                          <p:spTgt spid="8"/>
-                                        </p:tgtEl>
-                                      </p:cBhvr>
-                                    </p:animEffect>
-                                    <p:set>
-                                      <p:cBhvr>
-                                        <p:cTn id="20" dur="1" fill="hold">
-                                          <p:stCondLst>
-                                            <p:cond delay="499"/>
-                                          </p:stCondLst>
-                                        </p:cTn>
-                                        <p:tgtEl>
-                                          <p:spTgt spid="8"/>
-                                        </p:tgtEl>
-                                        <p:attrNameLst>
-                                          <p:attrName>style.visibility</p:attrName>
-                                        </p:attrNameLst>
-                                      </p:cBhvr>
-                                      <p:to>
-                                        <p:strVal val="hidden"/>
-                                      </p:to>
-                                    </p:set>
-                                  </p:childTnLst>
-                                </p:cTn>
-                              </p:par>
-                            </p:childTnLst>
-                          </p:cTn>
-                        </p:par>
-                      </p:childTnLst>
-                    </p:cTn>
-                  </p:par>
-                </p:childTnLst>
-              </p:cTn>
-              <p:prevCondLst>
-                <p:cond evt="onPrev" delay="0">
-                  <p:tgtEl>
-                    <p:sldTgt/>
-                  </p:tgtEl>
-                </p:cond>
-              </p:prevCondLst>
-              <p:nextCondLst>
-                <p:cond evt="onNext" delay="0">
-                  <p:tgtEl>
-                    <p:sldTgt/>
-                  </p:tgtEl>
-                </p:cond>
-              </p:nextCondLst>
-            </p:seq>
-          </p:childTnLst>
-        </p:cTn>
-      </p:par>
-    </p:tnLst>
-    <p:bldLst>
-      <p:bldP spid="7" grpId="0" animBg="1"/>
-      <p:bldP spid="7" grpId="1" animBg="1"/>
-      <p:bldP spid="8" grpId="0" animBg="1"/>
-      <p:bldP spid="8" grpId="1" animBg="1"/>
-    </p:bldLst>
-  </p:timing>
-</p:sld>
-</file>
-
-<file path=ppt/slides/slide20.xml><?xml version="1.0" encoding="utf-8"?>
+<file path=ppt/slides/slide23.xml><?xml version="1.0" encoding="utf-8"?>
 <p:sld xmlns:a="http://schemas.openxmlformats.org/drawingml/2006/main" xmlns:r="http://schemas.openxmlformats.org/officeDocument/2006/relationships" xmlns:p="http://schemas.openxmlformats.org/presentationml/2006/main">
   <p:cSld>
     <p:spTree>
@@ -24075,7 +24413,7 @@
 </p:sld>
 </file>
 
-<file path=ppt/slides/slide21.xml><?xml version="1.0" encoding="utf-8"?>
+<file path=ppt/slides/slide24.xml><?xml version="1.0" encoding="utf-8"?>
 <p:sld xmlns:a="http://schemas.openxmlformats.org/drawingml/2006/main" xmlns:r="http://schemas.openxmlformats.org/officeDocument/2006/relationships" xmlns:p="http://schemas.openxmlformats.org/presentationml/2006/main">
   <p:cSld>
     <p:spTree>
@@ -25899,7 +26237,7 @@
 </p:sld>
 </file>
 
-<file path=ppt/slides/slide22.xml><?xml version="1.0" encoding="utf-8"?>
+<file path=ppt/slides/slide25.xml><?xml version="1.0" encoding="utf-8"?>
 <p:sld xmlns:a="http://schemas.openxmlformats.org/drawingml/2006/main" xmlns:r="http://schemas.openxmlformats.org/officeDocument/2006/relationships" xmlns:p="http://schemas.openxmlformats.org/presentationml/2006/main">
   <p:cSld>
     <p:spTree>
@@ -26275,7 +26613,7 @@
 </p:sld>
 </file>
 
-<file path=ppt/slides/slide23.xml><?xml version="1.0" encoding="utf-8"?>
+<file path=ppt/slides/slide26.xml><?xml version="1.0" encoding="utf-8"?>
 <p:sld xmlns:a="http://schemas.openxmlformats.org/drawingml/2006/main" xmlns:r="http://schemas.openxmlformats.org/officeDocument/2006/relationships" xmlns:p="http://schemas.openxmlformats.org/presentationml/2006/main">
   <p:cSld>
     <p:spTree>
@@ -26599,7 +26937,7 @@
 </p:sld>
 </file>
 
-<file path=ppt/slides/slide24.xml><?xml version="1.0" encoding="utf-8"?>
+<file path=ppt/slides/slide27.xml><?xml version="1.0" encoding="utf-8"?>
 <p:sld xmlns:a="http://schemas.openxmlformats.org/drawingml/2006/main" xmlns:r="http://schemas.openxmlformats.org/officeDocument/2006/relationships" xmlns:p="http://schemas.openxmlformats.org/presentationml/2006/main">
   <p:cSld>
     <p:spTree>

</xml_diff>